<commit_message>
Updated journey ppt 2
</commit_message>
<xml_diff>
--- a/Journey ppt 2.pptx
+++ b/Journey ppt 2.pptx
@@ -10535,6 +10535,42 @@
           </a:p>
         </p:txBody>
       </p:sp>
+      <p:pic>
+        <p:nvPicPr>
+          <p:cNvPr id="8" name="Picture 7" descr="A group of people posing for a photo&#10;&#10;Description automatically generated">
+            <a:extLst>
+              <a:ext uri="{FF2B5EF4-FFF2-40B4-BE49-F238E27FC236}">
+                <a16:creationId xmlns:a16="http://schemas.microsoft.com/office/drawing/2014/main" id="{75252013-E245-3D03-469A-E787509A00EB}"/>
+              </a:ext>
+            </a:extLst>
+          </p:cNvPr>
+          <p:cNvPicPr>
+            <a:picLocks noChangeAspect="1"/>
+          </p:cNvPicPr>
+          <p:nvPr/>
+        </p:nvPicPr>
+        <p:blipFill>
+          <a:blip r:embed="rId7" cstate="screen">
+            <a:extLst>
+              <a:ext uri="{28A0092B-C50C-407E-A947-70E740481C1C}">
+                <a14:useLocalDpi xmlns:a14="http://schemas.microsoft.com/office/drawing/2010/main" val="0"/>
+              </a:ext>
+            </a:extLst>
+          </a:blip>
+          <a:stretch>
+            <a:fillRect/>
+          </a:stretch>
+        </p:blipFill>
+        <p:spPr>
+          <a:xfrm>
+            <a:off x="6400800" y="1994404"/>
+            <a:ext cx="5394206" cy="4045655"/>
+          </a:xfrm>
+          <a:prstGeom prst="rect">
+            <a:avLst/>
+          </a:prstGeom>
+        </p:spPr>
+      </p:pic>
     </p:spTree>
     <p:extLst>
       <p:ext uri="{BB962C8B-B14F-4D97-AF65-F5344CB8AC3E}">
@@ -11093,15 +11129,9 @@
               <a:rPr lang="en-US" sz="1800" dirty="0">
                 <a:hlinkClick r:id="rId8"/>
               </a:rPr>
-              <a:t>https://github.com/Aranyaa-k/Final-Case-Study</a:t>
+              <a:t>https://github.com/Aranyaa-k/Final-Case-Study.git</a:t>
             </a:r>
-            <a:r>
-              <a:rPr lang="en-US" sz="1800">
-                <a:hlinkClick r:id="rId8"/>
-              </a:rPr>
-              <a:t>.git</a:t>
-            </a:r>
-            <a:endParaRPr lang="en-US" sz="1800"/>
+            <a:endParaRPr lang="en-US" sz="1800" dirty="0"/>
           </a:p>
           <a:p>
             <a:pPr marL="0" indent="0">

</xml_diff>